<commit_message>
[feat]新增enhanced daaset 下的cross vit结果
</commit_message>
<xml_diff>
--- a/A1/Report/Vit.pptx
+++ b/A1/Report/Vit.pptx
@@ -5,7 +5,7 @@
     <p:sldMasterId id="2147483648" r:id="rId1"/>
   </p:sldMasterIdLst>
   <p:notesMasterIdLst>
-    <p:notesMasterId r:id="rId24"/>
+    <p:notesMasterId r:id="rId25"/>
   </p:notesMasterIdLst>
   <p:sldIdLst>
     <p:sldId id="258" r:id="rId2"/>
@@ -29,7 +29,8 @@
     <p:sldId id="275" r:id="rId20"/>
     <p:sldId id="276" r:id="rId21"/>
     <p:sldId id="278" r:id="rId22"/>
-    <p:sldId id="279" r:id="rId23"/>
+    <p:sldId id="280" r:id="rId23"/>
+    <p:sldId id="279" r:id="rId24"/>
   </p:sldIdLst>
   <p:sldSz cx="12192000" cy="6858000"/>
   <p:notesSz cx="6858000" cy="9144000"/>
@@ -218,7 +219,7 @@
           <a:p>
             <a:fld id="{621E1A28-2928-4835-A764-9B497A7CF365}" type="datetimeFigureOut">
               <a:rPr lang="zh-CN" altLang="en-US" smtClean="0"/>
-              <a:t>2025/8/16</a:t>
+              <a:t>2025/8/18</a:t>
             </a:fld>
             <a:endParaRPr lang="zh-CN" altLang="en-US"/>
           </a:p>
@@ -716,7 +717,7 @@
           <a:p>
             <a:fld id="{A56F5F28-5D3F-4084-AA56-9274F00A419E}" type="datetimeFigureOut">
               <a:rPr lang="zh-CN" altLang="en-US" smtClean="0"/>
-              <a:t>2025/8/16</a:t>
+              <a:t>2025/8/18</a:t>
             </a:fld>
             <a:endParaRPr lang="zh-CN" altLang="en-US"/>
           </a:p>
@@ -914,7 +915,7 @@
           <a:p>
             <a:fld id="{A56F5F28-5D3F-4084-AA56-9274F00A419E}" type="datetimeFigureOut">
               <a:rPr lang="zh-CN" altLang="en-US" smtClean="0"/>
-              <a:t>2025/8/16</a:t>
+              <a:t>2025/8/18</a:t>
             </a:fld>
             <a:endParaRPr lang="zh-CN" altLang="en-US"/>
           </a:p>
@@ -1122,7 +1123,7 @@
           <a:p>
             <a:fld id="{A56F5F28-5D3F-4084-AA56-9274F00A419E}" type="datetimeFigureOut">
               <a:rPr lang="zh-CN" altLang="en-US" smtClean="0"/>
-              <a:t>2025/8/16</a:t>
+              <a:t>2025/8/18</a:t>
             </a:fld>
             <a:endParaRPr lang="zh-CN" altLang="en-US"/>
           </a:p>
@@ -1320,7 +1321,7 @@
           <a:p>
             <a:fld id="{A56F5F28-5D3F-4084-AA56-9274F00A419E}" type="datetimeFigureOut">
               <a:rPr lang="zh-CN" altLang="en-US" smtClean="0"/>
-              <a:t>2025/8/16</a:t>
+              <a:t>2025/8/18</a:t>
             </a:fld>
             <a:endParaRPr lang="zh-CN" altLang="en-US"/>
           </a:p>
@@ -1595,7 +1596,7 @@
           <a:p>
             <a:fld id="{A56F5F28-5D3F-4084-AA56-9274F00A419E}" type="datetimeFigureOut">
               <a:rPr lang="zh-CN" altLang="en-US" smtClean="0"/>
-              <a:t>2025/8/16</a:t>
+              <a:t>2025/8/18</a:t>
             </a:fld>
             <a:endParaRPr lang="zh-CN" altLang="en-US"/>
           </a:p>
@@ -1860,7 +1861,7 @@
           <a:p>
             <a:fld id="{A56F5F28-5D3F-4084-AA56-9274F00A419E}" type="datetimeFigureOut">
               <a:rPr lang="zh-CN" altLang="en-US" smtClean="0"/>
-              <a:t>2025/8/16</a:t>
+              <a:t>2025/8/18</a:t>
             </a:fld>
             <a:endParaRPr lang="zh-CN" altLang="en-US"/>
           </a:p>
@@ -2272,7 +2273,7 @@
           <a:p>
             <a:fld id="{A56F5F28-5D3F-4084-AA56-9274F00A419E}" type="datetimeFigureOut">
               <a:rPr lang="zh-CN" altLang="en-US" smtClean="0"/>
-              <a:t>2025/8/16</a:t>
+              <a:t>2025/8/18</a:t>
             </a:fld>
             <a:endParaRPr lang="zh-CN" altLang="en-US"/>
           </a:p>
@@ -2413,7 +2414,7 @@
           <a:p>
             <a:fld id="{A56F5F28-5D3F-4084-AA56-9274F00A419E}" type="datetimeFigureOut">
               <a:rPr lang="zh-CN" altLang="en-US" smtClean="0"/>
-              <a:t>2025/8/16</a:t>
+              <a:t>2025/8/18</a:t>
             </a:fld>
             <a:endParaRPr lang="zh-CN" altLang="en-US"/>
           </a:p>
@@ -2526,7 +2527,7 @@
           <a:p>
             <a:fld id="{A56F5F28-5D3F-4084-AA56-9274F00A419E}" type="datetimeFigureOut">
               <a:rPr lang="zh-CN" altLang="en-US" smtClean="0"/>
-              <a:t>2025/8/16</a:t>
+              <a:t>2025/8/18</a:t>
             </a:fld>
             <a:endParaRPr lang="zh-CN" altLang="en-US"/>
           </a:p>
@@ -2837,7 +2838,7 @@
           <a:p>
             <a:fld id="{A56F5F28-5D3F-4084-AA56-9274F00A419E}" type="datetimeFigureOut">
               <a:rPr lang="zh-CN" altLang="en-US" smtClean="0"/>
-              <a:t>2025/8/16</a:t>
+              <a:t>2025/8/18</a:t>
             </a:fld>
             <a:endParaRPr lang="zh-CN" altLang="en-US"/>
           </a:p>
@@ -3125,7 +3126,7 @@
           <a:p>
             <a:fld id="{A56F5F28-5D3F-4084-AA56-9274F00A419E}" type="datetimeFigureOut">
               <a:rPr lang="zh-CN" altLang="en-US" smtClean="0"/>
-              <a:t>2025/8/16</a:t>
+              <a:t>2025/8/18</a:t>
             </a:fld>
             <a:endParaRPr lang="zh-CN" altLang="en-US"/>
           </a:p>
@@ -3366,7 +3367,7 @@
           <a:p>
             <a:fld id="{A56F5F28-5D3F-4084-AA56-9274F00A419E}" type="datetimeFigureOut">
               <a:rPr lang="zh-CN" altLang="en-US" smtClean="0"/>
-              <a:t>2025/8/16</a:t>
+              <a:t>2025/8/18</a:t>
             </a:fld>
             <a:endParaRPr lang="zh-CN" altLang="en-US"/>
           </a:p>
@@ -13392,7 +13393,13 @@
     </p:bg>
     <p:spTree>
       <p:nvGrpSpPr>
-        <p:cNvPr id="1" name=""/>
+        <p:cNvPr id="1" name="">
+          <a:extLst>
+            <a:ext uri="{FF2B5EF4-FFF2-40B4-BE49-F238E27FC236}">
+              <a16:creationId xmlns:a16="http://schemas.microsoft.com/office/drawing/2014/main" id="{82E886B9-14A7-1C3C-B237-6625464AC9E6}"/>
+            </a:ext>
+          </a:extLst>
+        </p:cNvPr>
         <p:cNvGrpSpPr/>
         <p:nvPr/>
       </p:nvGrpSpPr>
@@ -13406,10 +13413,10 @@
       </p:grpSpPr>
       <p:sp useBgFill="1">
         <p:nvSpPr>
-          <p:cNvPr id="20" name="Rectangle 19">
-            <a:extLst>
-              <a:ext uri="{FF2B5EF4-FFF2-40B4-BE49-F238E27FC236}">
-                <a16:creationId xmlns:a16="http://schemas.microsoft.com/office/drawing/2014/main" id="{BACC6370-2D7E-4714-9D71-7542949D7D5D}"/>
+          <p:cNvPr id="25" name="Rectangle 24">
+            <a:extLst>
+              <a:ext uri="{FF2B5EF4-FFF2-40B4-BE49-F238E27FC236}">
+                <a16:creationId xmlns:a16="http://schemas.microsoft.com/office/drawing/2014/main" id="{B73A72DE-2785-8827-2DD2-82D5031AE64F}"/>
               </a:ext>
               <a:ext uri="{C183D7F6-B498-43B3-948B-1728B52AA6E4}">
                 <adec:decorative xmlns:adec="http://schemas.microsoft.com/office/drawing/2017/decorative" val="1"/>
@@ -13476,6 +13483,561 @@
           <a:lstStyle/>
           <a:p>
             <a:pPr algn="ctr"/>
+            <a:endParaRPr lang="en-US" sz="2000"/>
+          </a:p>
+        </p:txBody>
+      </p:sp>
+      <p:sp>
+        <p:nvSpPr>
+          <p:cNvPr id="27" name="Rectangle 26">
+            <a:extLst>
+              <a:ext uri="{FF2B5EF4-FFF2-40B4-BE49-F238E27FC236}">
+                <a16:creationId xmlns:a16="http://schemas.microsoft.com/office/drawing/2014/main" id="{07DD76B7-544D-69BA-7525-616353D63CC3}"/>
+              </a:ext>
+              <a:ext uri="{C183D7F6-B498-43B3-948B-1728B52AA6E4}">
+                <adec:decorative xmlns:adec="http://schemas.microsoft.com/office/drawing/2017/decorative" val="1"/>
+              </a:ext>
+            </a:extLst>
+          </p:cNvPr>
+          <p:cNvSpPr>
+            <a:spLocks noGrp="1" noRot="1" noChangeAspect="1" noMove="1" noResize="1" noEditPoints="1" noAdjustHandles="1" noChangeArrowheads="1" noChangeShapeType="1" noTextEdit="1"/>
+          </p:cNvSpPr>
+          <p:nvPr>
+            <p:extLst>
+              <p:ext uri="{386F3935-93C4-4BCD-93E2-E3B085C9AB24}">
+                <p16:designElem xmlns:p16="http://schemas.microsoft.com/office/powerpoint/2015/main" val="1"/>
+              </p:ext>
+            </p:extLst>
+          </p:nvPr>
+        </p:nvSpPr>
+        <p:spPr>
+          <a:xfrm flipH="1">
+            <a:off x="2" y="492"/>
+            <a:ext cx="12191998" cy="1575955"/>
+          </a:xfrm>
+          <a:prstGeom prst="rect">
+            <a:avLst/>
+          </a:prstGeom>
+          <a:gradFill>
+            <a:gsLst>
+              <a:gs pos="0">
+                <a:schemeClr val="accent1">
+                  <a:lumMod val="50000"/>
+                </a:schemeClr>
+              </a:gs>
+              <a:gs pos="100000">
+                <a:schemeClr val="accent1">
+                  <a:lumMod val="75000"/>
+                </a:schemeClr>
+              </a:gs>
+            </a:gsLst>
+            <a:lin ang="8400000" scaled="0"/>
+          </a:gradFill>
+          <a:ln>
+            <a:noFill/>
+          </a:ln>
+        </p:spPr>
+        <p:style>
+          <a:lnRef idx="2">
+            <a:schemeClr val="accent1">
+              <a:shade val="50000"/>
+            </a:schemeClr>
+          </a:lnRef>
+          <a:fillRef idx="1">
+            <a:schemeClr val="accent1"/>
+          </a:fillRef>
+          <a:effectRef idx="0">
+            <a:schemeClr val="accent1"/>
+          </a:effectRef>
+          <a:fontRef idx="minor">
+            <a:schemeClr val="lt1"/>
+          </a:fontRef>
+        </p:style>
+        <p:txBody>
+          <a:bodyPr rtlCol="0" anchor="ctr"/>
+          <a:lstStyle/>
+          <a:p>
+            <a:pPr algn="ctr"/>
+            <a:endParaRPr lang="en-US"/>
+          </a:p>
+        </p:txBody>
+      </p:sp>
+      <p:sp>
+        <p:nvSpPr>
+          <p:cNvPr id="29" name="Rectangle 28">
+            <a:extLst>
+              <a:ext uri="{FF2B5EF4-FFF2-40B4-BE49-F238E27FC236}">
+                <a16:creationId xmlns:a16="http://schemas.microsoft.com/office/drawing/2014/main" id="{51F0C791-5E40-07E6-F791-A2292C4C794D}"/>
+              </a:ext>
+              <a:ext uri="{C183D7F6-B498-43B3-948B-1728B52AA6E4}">
+                <adec:decorative xmlns:adec="http://schemas.microsoft.com/office/drawing/2017/decorative" val="1"/>
+              </a:ext>
+            </a:extLst>
+          </p:cNvPr>
+          <p:cNvSpPr>
+            <a:spLocks noGrp="1" noRot="1" noChangeAspect="1" noMove="1" noResize="1" noEditPoints="1" noAdjustHandles="1" noChangeArrowheads="1" noChangeShapeType="1" noTextEdit="1"/>
+          </p:cNvSpPr>
+          <p:nvPr>
+            <p:extLst>
+              <p:ext uri="{386F3935-93C4-4BCD-93E2-E3B085C9AB24}">
+                <p16:designElem xmlns:p16="http://schemas.microsoft.com/office/powerpoint/2015/main" val="1"/>
+              </p:ext>
+            </p:extLst>
+          </p:nvPr>
+        </p:nvSpPr>
+        <p:spPr>
+          <a:xfrm rot="10800000" flipH="1">
+            <a:off x="8128857" y="35"/>
+            <a:ext cx="4063143" cy="1576412"/>
+          </a:xfrm>
+          <a:prstGeom prst="rect">
+            <a:avLst/>
+          </a:prstGeom>
+          <a:gradFill>
+            <a:gsLst>
+              <a:gs pos="19000">
+                <a:schemeClr val="accent1">
+                  <a:lumMod val="50000"/>
+                  <a:alpha val="68000"/>
+                </a:schemeClr>
+              </a:gs>
+              <a:gs pos="100000">
+                <a:schemeClr val="accent1">
+                  <a:alpha val="79000"/>
+                </a:schemeClr>
+              </a:gs>
+            </a:gsLst>
+            <a:lin ang="19200000" scaled="0"/>
+          </a:gradFill>
+          <a:ln>
+            <a:noFill/>
+          </a:ln>
+        </p:spPr>
+        <p:style>
+          <a:lnRef idx="2">
+            <a:schemeClr val="accent1">
+              <a:shade val="50000"/>
+            </a:schemeClr>
+          </a:lnRef>
+          <a:fillRef idx="1">
+            <a:schemeClr val="accent1"/>
+          </a:fillRef>
+          <a:effectRef idx="0">
+            <a:schemeClr val="accent1"/>
+          </a:effectRef>
+          <a:fontRef idx="minor">
+            <a:schemeClr val="lt1"/>
+          </a:fontRef>
+        </p:style>
+        <p:txBody>
+          <a:bodyPr rtlCol="0" anchor="ctr"/>
+          <a:lstStyle/>
+          <a:p>
+            <a:pPr algn="ctr"/>
+            <a:endParaRPr lang="en-US"/>
+          </a:p>
+        </p:txBody>
+      </p:sp>
+      <p:sp>
+        <p:nvSpPr>
+          <p:cNvPr id="31" name="Rectangle 30">
+            <a:extLst>
+              <a:ext uri="{FF2B5EF4-FFF2-40B4-BE49-F238E27FC236}">
+                <a16:creationId xmlns:a16="http://schemas.microsoft.com/office/drawing/2014/main" id="{88CE2D4D-DA1F-C447-C962-ADCC2247CAA2}"/>
+              </a:ext>
+              <a:ext uri="{C183D7F6-B498-43B3-948B-1728B52AA6E4}">
+                <adec:decorative xmlns:adec="http://schemas.microsoft.com/office/drawing/2017/decorative" val="1"/>
+              </a:ext>
+            </a:extLst>
+          </p:cNvPr>
+          <p:cNvSpPr>
+            <a:spLocks noGrp="1" noRot="1" noChangeAspect="1" noMove="1" noResize="1" noEditPoints="1" noAdjustHandles="1" noChangeArrowheads="1" noChangeShapeType="1" noTextEdit="1"/>
+          </p:cNvSpPr>
+          <p:nvPr>
+            <p:extLst>
+              <p:ext uri="{386F3935-93C4-4BCD-93E2-E3B085C9AB24}">
+                <p16:designElem xmlns:p16="http://schemas.microsoft.com/office/powerpoint/2015/main" val="1"/>
+              </p:ext>
+            </p:extLst>
+          </p:nvPr>
+        </p:nvSpPr>
+        <p:spPr>
+          <a:xfrm rot="5400000">
+            <a:off x="5307778" y="-5307777"/>
+            <a:ext cx="1576446" cy="12192001"/>
+          </a:xfrm>
+          <a:prstGeom prst="rect">
+            <a:avLst/>
+          </a:prstGeom>
+          <a:gradFill>
+            <a:gsLst>
+              <a:gs pos="16000">
+                <a:srgbClr val="000000">
+                  <a:alpha val="0"/>
+                </a:srgbClr>
+              </a:gs>
+              <a:gs pos="99000">
+                <a:srgbClr val="000000">
+                  <a:alpha val="87000"/>
+                </a:srgbClr>
+              </a:gs>
+            </a:gsLst>
+            <a:lin ang="11400000" scaled="0"/>
+          </a:gradFill>
+          <a:ln>
+            <a:noFill/>
+          </a:ln>
+        </p:spPr>
+        <p:style>
+          <a:lnRef idx="2">
+            <a:schemeClr val="accent1">
+              <a:shade val="50000"/>
+            </a:schemeClr>
+          </a:lnRef>
+          <a:fillRef idx="1">
+            <a:schemeClr val="accent1"/>
+          </a:fillRef>
+          <a:effectRef idx="0">
+            <a:schemeClr val="accent1"/>
+          </a:effectRef>
+          <a:fontRef idx="minor">
+            <a:schemeClr val="lt1"/>
+          </a:fontRef>
+        </p:style>
+        <p:txBody>
+          <a:bodyPr rtlCol="0" anchor="ctr"/>
+          <a:lstStyle/>
+          <a:p>
+            <a:pPr algn="ctr"/>
+            <a:endParaRPr lang="en-US" dirty="0"/>
+          </a:p>
+        </p:txBody>
+      </p:sp>
+      <p:sp>
+        <p:nvSpPr>
+          <p:cNvPr id="33" name="Rectangle 32">
+            <a:extLst>
+              <a:ext uri="{FF2B5EF4-FFF2-40B4-BE49-F238E27FC236}">
+                <a16:creationId xmlns:a16="http://schemas.microsoft.com/office/drawing/2014/main" id="{D5525746-0967-13C6-E029-8DA7BC452E0D}"/>
+              </a:ext>
+              <a:ext uri="{C183D7F6-B498-43B3-948B-1728B52AA6E4}">
+                <adec:decorative xmlns:adec="http://schemas.microsoft.com/office/drawing/2017/decorative" val="1"/>
+              </a:ext>
+            </a:extLst>
+          </p:cNvPr>
+          <p:cNvSpPr>
+            <a:spLocks noGrp="1" noRot="1" noChangeAspect="1" noMove="1" noResize="1" noEditPoints="1" noAdjustHandles="1" noChangeArrowheads="1" noChangeShapeType="1" noTextEdit="1"/>
+          </p:cNvSpPr>
+          <p:nvPr>
+            <p:extLst>
+              <p:ext uri="{386F3935-93C4-4BCD-93E2-E3B085C9AB24}">
+                <p16:designElem xmlns:p16="http://schemas.microsoft.com/office/powerpoint/2015/main" val="1"/>
+              </p:ext>
+            </p:extLst>
+          </p:nvPr>
+        </p:nvSpPr>
+        <p:spPr>
+          <a:xfrm>
+            <a:off x="3825434" y="986"/>
+            <a:ext cx="4303422" cy="1575461"/>
+          </a:xfrm>
+          <a:prstGeom prst="rect">
+            <a:avLst/>
+          </a:prstGeom>
+          <a:gradFill>
+            <a:gsLst>
+              <a:gs pos="0">
+                <a:schemeClr val="accent1">
+                  <a:alpha val="17000"/>
+                </a:schemeClr>
+              </a:gs>
+              <a:gs pos="74000">
+                <a:schemeClr val="accent1">
+                  <a:lumMod val="50000"/>
+                  <a:alpha val="0"/>
+                </a:schemeClr>
+              </a:gs>
+            </a:gsLst>
+            <a:lin ang="14400000" scaled="0"/>
+          </a:gradFill>
+          <a:ln>
+            <a:noFill/>
+          </a:ln>
+        </p:spPr>
+        <p:style>
+          <a:lnRef idx="2">
+            <a:schemeClr val="accent1">
+              <a:shade val="50000"/>
+            </a:schemeClr>
+          </a:lnRef>
+          <a:fillRef idx="1">
+            <a:schemeClr val="accent1"/>
+          </a:fillRef>
+          <a:effectRef idx="0">
+            <a:schemeClr val="accent1"/>
+          </a:effectRef>
+          <a:fontRef idx="minor">
+            <a:schemeClr val="lt1"/>
+          </a:fontRef>
+        </p:style>
+        <p:txBody>
+          <a:bodyPr rtlCol="0" anchor="ctr"/>
+          <a:lstStyle/>
+          <a:p>
+            <a:pPr algn="ctr"/>
+            <a:endParaRPr lang="en-US"/>
+          </a:p>
+        </p:txBody>
+      </p:sp>
+      <p:sp>
+        <p:nvSpPr>
+          <p:cNvPr id="2" name="标题 1">
+            <a:extLst>
+              <a:ext uri="{FF2B5EF4-FFF2-40B4-BE49-F238E27FC236}">
+                <a16:creationId xmlns:a16="http://schemas.microsoft.com/office/drawing/2014/main" id="{9088B3CA-53AB-E855-AA9C-23955AFD807C}"/>
+              </a:ext>
+            </a:extLst>
+          </p:cNvPr>
+          <p:cNvSpPr>
+            <a:spLocks noGrp="1"/>
+          </p:cNvSpPr>
+          <p:nvPr>
+            <p:ph type="ctrTitle"/>
+          </p:nvPr>
+        </p:nvSpPr>
+        <p:spPr>
+          <a:xfrm>
+            <a:off x="699714" y="353160"/>
+            <a:ext cx="7091300" cy="898581"/>
+          </a:xfrm>
+        </p:spPr>
+        <p:txBody>
+          <a:bodyPr anchor="ctr">
+            <a:normAutofit fontScale="90000"/>
+          </a:bodyPr>
+          <a:lstStyle/>
+          <a:p>
+            <a:pPr algn="l"/>
+            <a:r>
+              <a:rPr lang="en-US" altLang="zh-CN" sz="4000" dirty="0">
+                <a:solidFill>
+                  <a:srgbClr val="FFFFFF"/>
+                </a:solidFill>
+              </a:rPr>
+              <a:t>Cross Vit  with enhanced dataset</a:t>
+            </a:r>
+            <a:endParaRPr lang="zh-CN" altLang="en-US" sz="4000" dirty="0">
+              <a:solidFill>
+                <a:srgbClr val="FFFFFF"/>
+              </a:solidFill>
+            </a:endParaRPr>
+          </a:p>
+        </p:txBody>
+      </p:sp>
+      <p:sp>
+        <p:nvSpPr>
+          <p:cNvPr id="10" name="文本框 9">
+            <a:extLst>
+              <a:ext uri="{FF2B5EF4-FFF2-40B4-BE49-F238E27FC236}">
+                <a16:creationId xmlns:a16="http://schemas.microsoft.com/office/drawing/2014/main" id="{821B4D9C-9D52-9D0C-999C-D2B68A60631B}"/>
+              </a:ext>
+            </a:extLst>
+          </p:cNvPr>
+          <p:cNvSpPr txBox="1"/>
+          <p:nvPr/>
+        </p:nvSpPr>
+        <p:spPr>
+          <a:xfrm>
+            <a:off x="8442036" y="264982"/>
+            <a:ext cx="3592946" cy="646331"/>
+          </a:xfrm>
+          <a:prstGeom prst="rect">
+            <a:avLst/>
+          </a:prstGeom>
+          <a:noFill/>
+        </p:spPr>
+        <p:txBody>
+          <a:bodyPr wrap="square" rtlCol="0">
+            <a:spAutoFit/>
+          </a:bodyPr>
+          <a:lstStyle/>
+          <a:p>
+            <a:r>
+              <a:rPr lang="en-US" altLang="zh-CN" dirty="0">
+                <a:solidFill>
+                  <a:schemeClr val="bg1"/>
+                </a:solidFill>
+              </a:rPr>
+              <a:t>Accuracy rate : 80.47</a:t>
+            </a:r>
+            <a:r>
+              <a:rPr lang="en-US" altLang="zh-CN" dirty="0"/>
+              <a:t>%</a:t>
+            </a:r>
+          </a:p>
+          <a:p>
+            <a:r>
+              <a:rPr lang="en-US" altLang="zh-CN" dirty="0">
+                <a:solidFill>
+                  <a:schemeClr val="bg1"/>
+                </a:solidFill>
+              </a:rPr>
+              <a:t>Time Cost : 240min</a:t>
+            </a:r>
+            <a:endParaRPr lang="zh-CN" altLang="en-US" dirty="0">
+              <a:solidFill>
+                <a:schemeClr val="bg1"/>
+              </a:solidFill>
+            </a:endParaRPr>
+          </a:p>
+        </p:txBody>
+      </p:sp>
+      <p:pic>
+        <p:nvPicPr>
+          <p:cNvPr id="6" name="图片 5" descr="图表, 折线图&#10;&#10;AI 生成的内容可能不正确。">
+            <a:extLst>
+              <a:ext uri="{FF2B5EF4-FFF2-40B4-BE49-F238E27FC236}">
+                <a16:creationId xmlns:a16="http://schemas.microsoft.com/office/drawing/2014/main" id="{F4AA9877-B62E-3937-F5C1-F0C893401C1D}"/>
+              </a:ext>
+            </a:extLst>
+          </p:cNvPr>
+          <p:cNvPicPr>
+            <a:picLocks noChangeAspect="1"/>
+          </p:cNvPicPr>
+          <p:nvPr/>
+        </p:nvPicPr>
+        <p:blipFill>
+          <a:blip r:embed="rId2">
+            <a:extLst>
+              <a:ext uri="{28A0092B-C50C-407E-A947-70E740481C1C}">
+                <a14:useLocalDpi xmlns:a14="http://schemas.microsoft.com/office/drawing/2010/main" val="0"/>
+              </a:ext>
+            </a:extLst>
+          </a:blip>
+          <a:stretch>
+            <a:fillRect/>
+          </a:stretch>
+        </p:blipFill>
+        <p:spPr>
+          <a:xfrm>
+            <a:off x="790183" y="1603915"/>
+            <a:ext cx="10611633" cy="5033782"/>
+          </a:xfrm>
+          <a:prstGeom prst="rect">
+            <a:avLst/>
+          </a:prstGeom>
+        </p:spPr>
+      </p:pic>
+    </p:spTree>
+    <p:extLst>
+      <p:ext uri="{BB962C8B-B14F-4D97-AF65-F5344CB8AC3E}">
+        <p14:creationId xmlns:p14="http://schemas.microsoft.com/office/powerpoint/2010/main" val="1865029116"/>
+      </p:ext>
+    </p:extLst>
+  </p:cSld>
+  <p:clrMapOvr>
+    <a:masterClrMapping/>
+  </p:clrMapOvr>
+</p:sld>
+</file>
+
+<file path=ppt/slides/slide23.xml><?xml version="1.0" encoding="utf-8"?>
+<p:sld xmlns:a="http://schemas.openxmlformats.org/drawingml/2006/main" xmlns:r="http://schemas.openxmlformats.org/officeDocument/2006/relationships" xmlns:p="http://schemas.openxmlformats.org/presentationml/2006/main">
+  <p:cSld>
+    <p:bg>
+      <p:bgPr>
+        <a:solidFill>
+          <a:schemeClr val="bg1"/>
+        </a:solidFill>
+        <a:effectLst/>
+      </p:bgPr>
+    </p:bg>
+    <p:spTree>
+      <p:nvGrpSpPr>
+        <p:cNvPr id="1" name=""/>
+        <p:cNvGrpSpPr/>
+        <p:nvPr/>
+      </p:nvGrpSpPr>
+      <p:grpSpPr>
+        <a:xfrm>
+          <a:off x="0" y="0"/>
+          <a:ext cx="0" cy="0"/>
+          <a:chOff x="0" y="0"/>
+          <a:chExt cx="0" cy="0"/>
+        </a:xfrm>
+      </p:grpSpPr>
+      <p:sp useBgFill="1">
+        <p:nvSpPr>
+          <p:cNvPr id="20" name="Rectangle 19">
+            <a:extLst>
+              <a:ext uri="{FF2B5EF4-FFF2-40B4-BE49-F238E27FC236}">
+                <a16:creationId xmlns:a16="http://schemas.microsoft.com/office/drawing/2014/main" id="{BACC6370-2D7E-4714-9D71-7542949D7D5D}"/>
+              </a:ext>
+              <a:ext uri="{C183D7F6-B498-43B3-948B-1728B52AA6E4}">
+                <adec:decorative xmlns:adec="http://schemas.microsoft.com/office/drawing/2017/decorative" val="1"/>
+              </a:ext>
+            </a:extLst>
+          </p:cNvPr>
+          <p:cNvSpPr>
+            <a:spLocks noGrp="1" noRot="1" noChangeAspect="1" noMove="1" noResize="1" noEditPoints="1" noAdjustHandles="1" noChangeArrowheads="1" noChangeShapeType="1" noTextEdit="1"/>
+          </p:cNvSpPr>
+          <p:nvPr>
+            <p:extLst>
+              <p:ext uri="{386F3935-93C4-4BCD-93E2-E3B085C9AB24}">
+                <p16:designElem xmlns:p16="http://schemas.microsoft.com/office/powerpoint/2015/main" val="1"/>
+              </p:ext>
+            </p:extLst>
+          </p:nvPr>
+        </p:nvSpPr>
+        <p:spPr>
+          <a:xfrm>
+            <a:off x="0" y="0"/>
+            <a:ext cx="12192000" cy="6858000"/>
+          </a:xfrm>
+          <a:prstGeom prst="rect">
+            <a:avLst/>
+          </a:prstGeom>
+          <a:ln w="12700" cap="flat" cmpd="sng" algn="ctr">
+            <a:noFill/>
+            <a:prstDash val="solid"/>
+            <a:miter lim="800000"/>
+          </a:ln>
+          <a:effectLst/>
+          <a:extLst>
+            <a:ext uri="{91240B29-F687-4F45-9708-019B960494DF}">
+              <a14:hiddenLine xmlns:a14="http://schemas.microsoft.com/office/drawing/2010/main" w="12700" cap="flat" cmpd="sng" algn="ctr">
+                <a:solidFill>
+                  <a:schemeClr val="accent1">
+                    <a:shade val="50000"/>
+                  </a:schemeClr>
+                </a:solidFill>
+                <a:prstDash val="solid"/>
+                <a:miter lim="800000"/>
+              </a14:hiddenLine>
+            </a:ext>
+          </a:extLst>
+        </p:spPr>
+        <p:style>
+          <a:lnRef idx="2">
+            <a:schemeClr val="accent1">
+              <a:shade val="50000"/>
+            </a:schemeClr>
+          </a:lnRef>
+          <a:fillRef idx="1">
+            <a:schemeClr val="accent1"/>
+          </a:fillRef>
+          <a:effectRef idx="0">
+            <a:schemeClr val="accent1"/>
+          </a:effectRef>
+          <a:fontRef idx="minor">
+            <a:schemeClr val="lt1"/>
+          </a:fontRef>
+        </p:style>
+        <p:txBody>
+          <a:bodyPr rtlCol="0" anchor="ctr"/>
+          <a:lstStyle/>
+          <a:p>
+            <a:pPr algn="ctr"/>
             <a:endParaRPr lang="en-US"/>
           </a:p>
         </p:txBody>
@@ -13766,21 +14328,21 @@
             <p:ph idx="1"/>
             <p:extLst>
               <p:ext uri="{D42A27DB-BD31-4B8C-83A1-F6EECF244321}">
-                <p14:modId xmlns:p14="http://schemas.microsoft.com/office/powerpoint/2010/main" val="872567541"/>
+                <p14:modId xmlns:p14="http://schemas.microsoft.com/office/powerpoint/2010/main" val="802014232"/>
               </p:ext>
             </p:extLst>
           </p:nvPr>
         </p:nvGraphicFramePr>
         <p:xfrm>
-          <a:off x="904509" y="2112579"/>
-          <a:ext cx="10406924" cy="4192810"/>
+          <a:off x="715224" y="1575459"/>
+          <a:ext cx="10369873" cy="4192810"/>
         </p:xfrm>
         <a:graphic>
           <a:graphicData uri="http://schemas.openxmlformats.org/drawingml/2006/table">
             <a:tbl>
               <a:tblPr firstRow="1" bandRow="1"/>
               <a:tblGrid>
-                <a:gridCol w="1350013">
+                <a:gridCol w="1312962">
                   <a:extLst>
                     <a:ext uri="{9D8B030D-6E8A-4147-A177-3AD203B41FA5}">
                       <a16:colId xmlns:a16="http://schemas.microsoft.com/office/drawing/2014/main" val="1092187142"/>
@@ -13974,13 +14536,13 @@
                         <a:buNone/>
                       </a:pPr>
                       <a:r>
-                        <a:rPr lang="en-US" sz="1400" b="0" i="0" u="none" strike="noStrike">
+                        <a:rPr lang="en-US" sz="1400" b="0" i="0" u="none" strike="noStrike" dirty="0">
                           <a:effectLst/>
                           <a:latin typeface="Arial" panose="020B0604020202020204" pitchFamily="34" charset="0"/>
                         </a:rPr>
                         <a:t>1</a:t>
                       </a:r>
-                      <a:endParaRPr lang="en-US" altLang="zh-CN" sz="1400" b="0" i="0" u="none" strike="noStrike">
+                      <a:endParaRPr lang="en-US" altLang="zh-CN" sz="1400" b="0" i="0" u="none" strike="noStrike" dirty="0">
                         <a:effectLst/>
                         <a:latin typeface="Arial" panose="020B0604020202020204" pitchFamily="34" charset="0"/>
                       </a:endParaRPr>
@@ -14048,13 +14610,13 @@
                         <a:buNone/>
                       </a:pPr>
                       <a:r>
-                        <a:rPr lang="en-US" sz="1400" b="0" i="0" u="none" strike="noStrike">
+                        <a:rPr lang="en-US" sz="1400" b="0" i="0" u="none" strike="noStrike" dirty="0">
                           <a:effectLst/>
                           <a:latin typeface="Arial" panose="020B0604020202020204" pitchFamily="34" charset="0"/>
                         </a:rPr>
                         <a:t>—</a:t>
                       </a:r>
-                      <a:endParaRPr lang="en-US" altLang="zh-CN" sz="1400" b="0" i="0" u="none" strike="noStrike">
+                      <a:endParaRPr lang="en-US" altLang="zh-CN" sz="1400" b="0" i="0" u="none" strike="noStrike" dirty="0">
                         <a:effectLst/>
                         <a:latin typeface="Arial" panose="020B0604020202020204" pitchFamily="34" charset="0"/>
                       </a:endParaRPr>
@@ -14594,13 +15156,13 @@
                         <a:buNone/>
                       </a:pPr>
                       <a:r>
-                        <a:rPr lang="en-US" sz="1400" b="0" i="0" u="none" strike="noStrike">
+                        <a:rPr lang="en-US" sz="1400" b="0" i="0" u="none" strike="noStrike" dirty="0">
                           <a:effectLst/>
                           <a:latin typeface="Arial" panose="020B0604020202020204" pitchFamily="34" charset="0"/>
                         </a:rPr>
                         <a:t>5</a:t>
                       </a:r>
-                      <a:endParaRPr lang="en-US" altLang="zh-CN" sz="1400" b="0" i="0" u="none" strike="noStrike">
+                      <a:endParaRPr lang="en-US" altLang="zh-CN" sz="1400" b="0" i="0" u="none" strike="noStrike" dirty="0">
                         <a:effectLst/>
                         <a:latin typeface="Arial" panose="020B0604020202020204" pitchFamily="34" charset="0"/>
                       </a:endParaRPr>
@@ -14705,13 +15267,13 @@
                         <a:buNone/>
                       </a:pPr>
                       <a:r>
-                        <a:rPr lang="en-US" sz="1400" b="0" i="0" u="none" strike="noStrike">
+                        <a:rPr lang="en-US" sz="1400" b="0" i="0" u="none" strike="noStrike" dirty="0">
                           <a:effectLst/>
                           <a:latin typeface="Arial" panose="020B0604020202020204" pitchFamily="34" charset="0"/>
                         </a:rPr>
                         <a:t>63.52</a:t>
                       </a:r>
-                      <a:endParaRPr lang="en-US" altLang="zh-CN" sz="1400" b="0" i="0" u="none" strike="noStrike">
+                      <a:endParaRPr lang="en-US" altLang="zh-CN" sz="1400" b="0" i="0" u="none" strike="noStrike" dirty="0">
                         <a:effectLst/>
                         <a:latin typeface="Arial" panose="020B0604020202020204" pitchFamily="34" charset="0"/>
                       </a:endParaRPr>
@@ -14749,13 +15311,13 @@
                         <a:buNone/>
                       </a:pPr>
                       <a:r>
-                        <a:rPr lang="en-US" sz="1400" b="0" i="0" u="none" strike="noStrike">
+                        <a:rPr lang="en-US" sz="1400" b="0" i="0" u="none" strike="noStrike" dirty="0">
                           <a:effectLst/>
                           <a:latin typeface="Arial" panose="020B0604020202020204" pitchFamily="34" charset="0"/>
                         </a:rPr>
                         <a:t>6</a:t>
                       </a:r>
-                      <a:endParaRPr lang="en-US" altLang="zh-CN" sz="1400" b="0" i="0" u="none" strike="noStrike">
+                      <a:endParaRPr lang="en-US" altLang="zh-CN" sz="1400" b="0" i="0" u="none" strike="noStrike" dirty="0">
                         <a:effectLst/>
                         <a:latin typeface="Arial" panose="020B0604020202020204" pitchFamily="34" charset="0"/>
                       </a:endParaRPr>
@@ -14984,9 +15546,16 @@
                           <a:effectLst/>
                           <a:latin typeface="Arial" panose="020B0604020202020204" pitchFamily="34" charset="0"/>
                         </a:rPr>
-                        <a:t> = 0.1</a:t>
+                        <a:t> </a:t>
                       </a:r>
-                      <a:endParaRPr lang="en-US" altLang="zh-CN" sz="1400" b="0" i="0" u="none" strike="noStrike" dirty="0">
+                      <a:r>
+                        <a:rPr lang="en-US" sz="1400" b="0" i="0" u="none" strike="noStrike">
+                          <a:effectLst/>
+                          <a:latin typeface="Arial" panose="020B0604020202020204" pitchFamily="34" charset="0"/>
+                        </a:rPr>
+                        <a:t>= 0.1</a:t>
+                      </a:r>
+                      <a:endParaRPr lang="en-US" sz="1400" b="0" i="0" u="none" strike="noStrike" dirty="0">
                         <a:effectLst/>
                         <a:latin typeface="Arial" panose="020B0604020202020204" pitchFamily="34" charset="0"/>
                       </a:endParaRPr>
@@ -15021,9 +15590,22 @@
                           <a:effectLst/>
                           <a:latin typeface="Arial" panose="020B0604020202020204" pitchFamily="34" charset="0"/>
                         </a:rPr>
-                        <a:t>76.31</a:t>
+                        <a:t>76.31/</a:t>
+                      </a:r>
+                      <a:r>
+                        <a:rPr lang="en-US" sz="1400" b="0" i="0" u="none" strike="noStrike" dirty="0">
+                          <a:solidFill>
+                            <a:srgbClr val="FF0000"/>
+                          </a:solidFill>
+                          <a:effectLst/>
+                          <a:latin typeface="Arial" panose="020B0604020202020204" pitchFamily="34" charset="0"/>
+                        </a:rPr>
+                        <a:t>80.47(enhanced dataset)</a:t>
                       </a:r>
                       <a:endParaRPr lang="en-US" altLang="zh-CN" sz="1400" b="0" i="0" u="none" strike="noStrike" dirty="0">
+                        <a:solidFill>
+                          <a:srgbClr val="FF0000"/>
+                        </a:solidFill>
                         <a:effectLst/>
                         <a:latin typeface="Arial" panose="020B0604020202020204" pitchFamily="34" charset="0"/>
                       </a:endParaRPr>

</xml_diff>